<commit_message>
Minor fixes for search for information slides
</commit_message>
<xml_diff>
--- a/Courses/Computer-Modeling-and-IT/Computer-Modeling-and-IT-5-Class/08-Search-for-Information-on-a-Given-Topic/08-Search-for-Information-on-a-Given-Topic.pptx
+++ b/Courses/Computer-Modeling-and-IT/Computer-Modeling-and-IT-5-Class/08-Search-for-Information-on-a-Given-Topic/08-Search-for-Information-on-a-Given-Topic.pptx
@@ -295,7 +295,7 @@
           <a:p>
             <a:fld id="{4E087215-0C8F-4762-A664-737A353EC9A4}" type="datetimeFigureOut">
               <a:rPr lang="bg-BG" smtClean="0"/>
-              <a:t>19.10.2023 г.</a:t>
+              <a:t>31.10.23 г.</a:t>
             </a:fld>
             <a:endParaRPr lang="bg-BG"/>
           </a:p>
@@ -491,7 +491,7 @@
           <a:p>
             <a:fld id="{72D84649-876A-46C9-8472-14CB09C070D8}" type="datetimeFigureOut">
               <a:rPr lang="en-US" smtClean="0"/>
-              <a:t>10/19/2023</a:t>
+              <a:t>10/31/23</a:t>
             </a:fld>
             <a:endParaRPr lang="en-US"/>
           </a:p>
@@ -4231,7 +4231,7 @@
             <a:fld id="{055373AC-9AA7-423B-BA00-BA1C74164DBD}" type="datetime1">
               <a:rPr lang="en-US" smtClean="0"/>
               <a:pPr/>
-              <a:t>10/19/2023</a:t>
+              <a:t>10/31/23</a:t>
             </a:fld>
             <a:endParaRPr lang="en-US" dirty="0"/>
           </a:p>
@@ -7541,7 +7541,7 @@
           <a:lstStyle/>
           <a:p>
             <a:r>
-              <a:rPr lang="bg-BG" dirty="0" smtClean="0"/>
+              <a:rPr lang="bg-BG" dirty="0"/>
               <a:t>Извличане на полезна информация от интернет</a:t>
             </a:r>
             <a:endParaRPr lang="en-US" dirty="0"/>
@@ -7578,7 +7578,14 @@
           <a:p>
             <a:r>
               <a:rPr lang="ru-RU" dirty="0"/>
-              <a:t>Търсене на информация по зададена тема</a:t>
+              <a:t>Търсене на информация </a:t>
+            </a:r>
+            <a:br>
+              <a:rPr lang="en-US" dirty="0"/>
+            </a:br>
+            <a:r>
+              <a:rPr lang="ru-RU" dirty="0"/>
+              <a:t>по зададена тема</a:t>
             </a:r>
             <a:endParaRPr lang="en-US" dirty="0"/>
           </a:p>
@@ -7600,14 +7607,13 @@
               </a:ext>
             </a:extLst>
           </a:blip>
-          <a:stretch>
-            <a:fillRect/>
-          </a:stretch>
+          <a:srcRect/>
+          <a:stretch/>
         </p:blipFill>
         <p:spPr>
           <a:xfrm>
-            <a:off x="554746" y="3024977"/>
-            <a:ext cx="1769683" cy="825597"/>
+            <a:off x="554746" y="3040926"/>
+            <a:ext cx="1769683" cy="793699"/>
           </a:xfrm>
           <a:prstGeom prst="rect">
             <a:avLst/>
@@ -7728,13 +7734,6 @@
       <p:transition spd="slow" advClick="0" advTm="5000"/>
     </mc:Fallback>
   </mc:AlternateContent>
-  <p:timing>
-    <p:tnLst>
-      <p:par>
-        <p:cTn id="1" dur="indefinite" restart="never" nodeType="tmRoot"/>
-      </p:par>
-    </p:tnLst>
-  </p:timing>
 </p:sld>
 </file>
 
@@ -7802,7 +7801,7 @@
           <a:lstStyle/>
           <a:p>
             <a:r>
-              <a:rPr lang="bg-BG" sz="3500" dirty="0" smtClean="0"/>
+              <a:rPr lang="bg-BG" sz="3500" dirty="0"/>
               <a:t>Търсене на информация в интернет с ключови думи</a:t>
             </a:r>
             <a:endParaRPr lang="en-US" sz="3500" dirty="0"/>
@@ -7830,8 +7829,8 @@
         </p:blipFill>
         <p:spPr>
           <a:xfrm>
-            <a:off x="0" y="1101149"/>
-            <a:ext cx="12191999" cy="5747851"/>
+            <a:off x="0" y="1044001"/>
+            <a:ext cx="12191999" cy="5805000"/>
           </a:xfrm>
           <a:prstGeom prst="rect">
             <a:avLst/>
@@ -7898,7 +7897,7 @@
           <a:p>
             <a:pPr algn="ctr"/>
             <a:r>
-              <a:rPr lang="bg-BG" sz="2800" b="1" dirty="0" smtClean="0">
+              <a:rPr lang="bg-BG" sz="2800" b="1" dirty="0">
                 <a:solidFill>
                   <a:srgbClr val="FFFFFF"/>
                 </a:solidFill>
@@ -8053,7 +8052,7 @@
           <a:p>
             <a:pPr algn="ctr"/>
             <a:r>
-              <a:rPr lang="bg-BG" sz="2800" b="1" dirty="0" smtClean="0">
+              <a:rPr lang="bg-BG" sz="2800" b="1" dirty="0">
                 <a:solidFill>
                   <a:srgbClr val="FFFFFF"/>
                 </a:solidFill>
@@ -8440,7 +8439,7 @@
           <a:p>
             <a:r>
               <a:rPr lang="bg-BG" dirty="0"/>
-              <a:t>Знака "</a:t>
+              <a:t>Знакът "</a:t>
             </a:r>
             <a:r>
               <a:rPr lang="bg-BG" b="1" dirty="0">
@@ -8455,7 +8454,7 @@
               <a:t>" се поставя на </a:t>
             </a:r>
             <a:r>
-              <a:rPr lang="bg-BG" b="1" dirty="0" smtClean="0"/>
+              <a:rPr lang="bg-BG" b="1" dirty="0"/>
               <a:t>място на буква </a:t>
             </a:r>
             <a:r>
@@ -8470,20 +8469,12 @@
               <a:t>Поставя се, ако не сме сигурни в </a:t>
             </a:r>
             <a:r>
-              <a:rPr lang="bg-BG" b="1" dirty="0" smtClean="0"/>
+              <a:rPr lang="bg-BG" b="1" dirty="0"/>
               <a:t>изписването</a:t>
             </a:r>
             <a:r>
-              <a:rPr lang="bg-BG" dirty="0" smtClean="0"/>
-              <a:t> </a:t>
-            </a:r>
-            <a:r>
               <a:rPr lang="bg-BG" dirty="0"/>
-              <a:t>на дадена </a:t>
-            </a:r>
-            <a:r>
-              <a:rPr lang="bg-BG" dirty="0" smtClean="0"/>
-              <a:t>дума</a:t>
+              <a:t> на дадена дума</a:t>
             </a:r>
             <a:endParaRPr lang="en-US" dirty="0"/>
           </a:p>
@@ -8542,6 +8533,9 @@
                     <p:cTn id="3" fill="hold">
                       <p:stCondLst>
                         <p:cond delay="indefinite"/>
+                        <p:cond evt="onBegin" delay="0">
+                          <p:tn val="2"/>
+                        </p:cond>
                       </p:stCondLst>
                       <p:childTnLst>
                         <p:par>
@@ -8551,7 +8545,7 @@
                             </p:stCondLst>
                             <p:childTnLst>
                               <p:par>
-                                <p:cTn id="5" presetID="1" presetClass="entr" presetSubtype="0" fill="hold" nodeType="clickEffect">
+                                <p:cTn id="5" presetID="1" presetClass="entr" presetSubtype="0" fill="hold" nodeType="withEffect">
                                   <p:stCondLst>
                                     <p:cond delay="0"/>
                                   </p:stCondLst>
@@ -8865,37 +8859,29 @@
           <a:lstStyle/>
           <a:p>
             <a:r>
-              <a:rPr lang="bg-BG" dirty="0" smtClean="0"/>
+              <a:rPr lang="bg-BG" dirty="0"/>
               <a:t>Отворете </a:t>
             </a:r>
             <a:r>
-              <a:rPr lang="en-US" dirty="0" smtClean="0">
+              <a:rPr lang="en-US" dirty="0">
                 <a:hlinkClick r:id="rId2"/>
               </a:rPr>
               <a:t>www.google.com</a:t>
             </a:r>
             <a:r>
-              <a:rPr lang="en-US" dirty="0" smtClean="0"/>
+              <a:rPr lang="en-US" dirty="0"/>
               <a:t> </a:t>
             </a:r>
             <a:r>
-              <a:rPr lang="bg-BG" dirty="0" smtClean="0"/>
-              <a:t>и потърсете отговор на въпроса – </a:t>
-            </a:r>
-            <a:r>
               <a:rPr lang="bg-BG" dirty="0"/>
-              <a:t>"Има ли </a:t>
-            </a:r>
-            <a:r>
-              <a:rPr lang="bg-BG" dirty="0" smtClean="0"/>
-              <a:t>суперкомпютър в българия</a:t>
-            </a:r>
-            <a:r>
-              <a:rPr lang="en-US" dirty="0" smtClean="0"/>
+              <a:t>и потърсете отговор на въпроса – "Има ли суперкомпютър в България</a:t>
+            </a:r>
+            <a:r>
+              <a:rPr lang="en-US" dirty="0"/>
               <a:t>?</a:t>
             </a:r>
             <a:r>
-              <a:rPr lang="bg-BG" dirty="0" smtClean="0"/>
+              <a:rPr lang="bg-BG" dirty="0"/>
               <a:t>"</a:t>
             </a:r>
             <a:endParaRPr lang="en-US" dirty="0"/>
@@ -8918,8 +8904,8 @@
           <a:lstStyle/>
           <a:p>
             <a:r>
-              <a:rPr lang="bg-BG" dirty="0" smtClean="0"/>
-              <a:t>Задача: Търсене на възрожденци</a:t>
+              <a:rPr lang="bg-BG" dirty="0"/>
+              <a:t>Задача: Търсене на суперкомпютри</a:t>
             </a:r>
             <a:endParaRPr lang="en-US" dirty="0"/>
           </a:p>
@@ -8947,7 +8933,7 @@
         </p:blipFill>
         <p:spPr>
           <a:xfrm>
-            <a:off x="2488050" y="2664751"/>
+            <a:off x="2488050" y="2574000"/>
             <a:ext cx="7222800" cy="3990749"/>
           </a:xfrm>
           <a:prstGeom prst="rect">
@@ -8980,13 +8966,6 @@
       <p:transition spd="slow" advClick="0" advTm="5000"/>
     </mc:Fallback>
   </mc:AlternateContent>
-  <p:timing>
-    <p:tnLst>
-      <p:par>
-        <p:cTn id="1" dur="indefinite" restart="never" nodeType="tmRoot"/>
-      </p:par>
-    </p:tnLst>
-  </p:timing>
 </p:sld>
 </file>
 
@@ -9029,11 +9008,7 @@
           <a:p>
             <a:r>
               <a:rPr lang="bg-BG" dirty="0"/>
-              <a:t>͏Разширено търсене на </a:t>
-            </a:r>
-            <a:r>
-              <a:rPr lang="bg-BG" dirty="0" smtClean="0"/>
-              <a:t>информация</a:t>
+              <a:t>͏Разширено търсене на информация</a:t>
             </a:r>
             <a:endParaRPr lang="en-US" dirty="0"/>
           </a:p>
@@ -9126,13 +9101,6 @@
       <p:transition spd="slow" advClick="0" advTm="5000"/>
     </mc:Fallback>
   </mc:AlternateContent>
-  <p:timing>
-    <p:tnLst>
-      <p:par>
-        <p:cTn id="1" dur="indefinite" restart="never" nodeType="tmRoot"/>
-      </p:par>
-    </p:tnLst>
-  </p:timing>
 </p:sld>
 </file>
 
@@ -9169,11 +9137,11 @@
           <a:lstStyle/>
           <a:p>
             <a:r>
-              <a:rPr lang="bg-BG" dirty="0" smtClean="0"/>
+              <a:rPr lang="bg-BG" dirty="0"/>
               <a:t>͏</a:t>
             </a:r>
             <a:r>
-              <a:rPr lang="bg-BG" b="1" dirty="0" smtClean="0">
+              <a:rPr lang="bg-BG" b="1" dirty="0">
                 <a:solidFill>
                   <a:schemeClr val="bg1"/>
                 </a:solidFill>
@@ -9181,14 +9149,14 @@
               <a:t>Разширено търсене </a:t>
             </a:r>
             <a:r>
-              <a:rPr lang="bg-BG" dirty="0" smtClean="0"/>
+              <a:rPr lang="bg-BG" dirty="0"/>
               <a:t>– възможност за задаване на повече детайли при търсене</a:t>
             </a:r>
           </a:p>
           <a:p>
             <a:r>
-              <a:rPr lang="bg-BG" dirty="0" smtClean="0"/>
-              <a:t>Като например:</a:t>
+              <a:rPr lang="bg-BG" dirty="0"/>
+              <a:t>Примери:</a:t>
             </a:r>
           </a:p>
           <a:p>
@@ -9198,10 +9166,9 @@
               </a:spcAft>
             </a:pPr>
             <a:r>
-              <a:rPr lang="bg-BG" dirty="0" smtClean="0"/>
+              <a:rPr lang="bg-BG" dirty="0"/>
               <a:t>Конкретни думи или фрази</a:t>
             </a:r>
-            <a:endParaRPr lang="bg-BG" dirty="0"/>
           </a:p>
           <a:p>
             <a:pPr lvl="1">
@@ -9210,7 +9177,7 @@
               </a:spcAft>
             </a:pPr>
             <a:r>
-              <a:rPr lang="bg-BG" dirty="0" smtClean="0"/>
+              <a:rPr lang="bg-BG" dirty="0"/>
               <a:t>Тип и големина на файла</a:t>
             </a:r>
           </a:p>
@@ -9221,7 +9188,7 @@
               </a:spcAft>
             </a:pPr>
             <a:r>
-              <a:rPr lang="bg-BG" dirty="0" smtClean="0"/>
+              <a:rPr lang="bg-BG" dirty="0"/>
               <a:t>Език на сайта</a:t>
             </a:r>
           </a:p>
@@ -9243,7 +9210,7 @@
           <a:lstStyle/>
           <a:p>
             <a:r>
-              <a:rPr lang="bg-BG" dirty="0" smtClean="0"/>
+              <a:rPr lang="bg-BG" dirty="0"/>
               <a:t>Разширено търсене</a:t>
             </a:r>
             <a:endParaRPr lang="en-US" dirty="0"/>
@@ -9355,33 +9322,15 @@
                                   </p:childTnLst>
                                 </p:cTn>
                               </p:par>
-                            </p:childTnLst>
-                          </p:cTn>
-                        </p:par>
-                      </p:childTnLst>
-                    </p:cTn>
-                  </p:par>
-                  <p:par>
-                    <p:cTn id="7" fill="hold">
-                      <p:stCondLst>
-                        <p:cond delay="indefinite"/>
-                      </p:stCondLst>
-                      <p:childTnLst>
-                        <p:par>
-                          <p:cTn id="8" fill="hold">
-                            <p:stCondLst>
-                              <p:cond delay="0"/>
-                            </p:stCondLst>
-                            <p:childTnLst>
                               <p:par>
-                                <p:cTn id="9" presetID="1" presetClass="entr" presetSubtype="0" fill="hold" nodeType="clickEffect">
+                                <p:cTn id="7" presetID="1" presetClass="entr" presetSubtype="0" fill="hold" nodeType="withEffect">
                                   <p:stCondLst>
                                     <p:cond delay="0"/>
                                   </p:stCondLst>
                                   <p:childTnLst>
                                     <p:set>
                                       <p:cBhvr>
-                                        <p:cTn id="10" dur="1" fill="hold">
+                                        <p:cTn id="8" dur="1" fill="hold">
                                           <p:stCondLst>
                                             <p:cond delay="0"/>
                                           </p:stCondLst>
@@ -9411,26 +9360,26 @@
                     </p:cTn>
                   </p:par>
                   <p:par>
-                    <p:cTn id="11" fill="hold">
+                    <p:cTn id="9" fill="hold">
                       <p:stCondLst>
                         <p:cond delay="indefinite"/>
                       </p:stCondLst>
                       <p:childTnLst>
                         <p:par>
-                          <p:cTn id="12" fill="hold">
+                          <p:cTn id="10" fill="hold">
                             <p:stCondLst>
                               <p:cond delay="0"/>
                             </p:stCondLst>
                             <p:childTnLst>
                               <p:par>
-                                <p:cTn id="13" presetID="1" presetClass="entr" presetSubtype="0" fill="hold" nodeType="clickEffect">
+                                <p:cTn id="11" presetID="1" presetClass="entr" presetSubtype="0" fill="hold" nodeType="clickEffect">
                                   <p:stCondLst>
                                     <p:cond delay="0"/>
                                   </p:stCondLst>
                                   <p:childTnLst>
                                     <p:set>
                                       <p:cBhvr>
-                                        <p:cTn id="14" dur="1" fill="hold">
+                                        <p:cTn id="12" dur="1" fill="hold">
                                           <p:stCondLst>
                                             <p:cond delay="0"/>
                                           </p:stCondLst>
@@ -9460,26 +9409,26 @@
                     </p:cTn>
                   </p:par>
                   <p:par>
-                    <p:cTn id="15" fill="hold">
+                    <p:cTn id="13" fill="hold">
                       <p:stCondLst>
                         <p:cond delay="indefinite"/>
                       </p:stCondLst>
                       <p:childTnLst>
                         <p:par>
-                          <p:cTn id="16" fill="hold">
+                          <p:cTn id="14" fill="hold">
                             <p:stCondLst>
                               <p:cond delay="0"/>
                             </p:stCondLst>
                             <p:childTnLst>
                               <p:par>
-                                <p:cTn id="17" presetID="1" presetClass="entr" presetSubtype="0" fill="hold" nodeType="clickEffect">
+                                <p:cTn id="15" presetID="1" presetClass="entr" presetSubtype="0" fill="hold" nodeType="clickEffect">
                                   <p:stCondLst>
                                     <p:cond delay="0"/>
                                   </p:stCondLst>
                                   <p:childTnLst>
                                     <p:set>
                                       <p:cBhvr>
-                                        <p:cTn id="18" dur="1" fill="hold">
+                                        <p:cTn id="16" dur="1" fill="hold">
                                           <p:stCondLst>
                                             <p:cond delay="0"/>
                                           </p:stCondLst>
@@ -9686,7 +9635,7 @@
           <a:p>
             <a:pPr algn="ctr"/>
             <a:r>
-              <a:rPr lang="bg-BG" sz="2800" b="1" dirty="0" smtClean="0">
+              <a:rPr lang="bg-BG" sz="2800" b="1" dirty="0">
                 <a:solidFill>
                   <a:srgbClr val="FFFFFF"/>
                 </a:solidFill>
@@ -9701,7 +9650,7 @@
               <a:t>За да пуснем разширеното търсене, отваряме менюто </a:t>
             </a:r>
             <a:r>
-              <a:rPr lang="bg-BG" sz="2800" b="1" dirty="0" smtClean="0">
+              <a:rPr lang="bg-BG" sz="2800" b="1" dirty="0">
                 <a:solidFill>
                   <a:schemeClr val="bg1">
                     <a:lumMod val="60000"/>
@@ -9988,7 +9937,7 @@
           <a:p>
             <a:pPr algn="ctr"/>
             <a:r>
-              <a:rPr lang="bg-BG" sz="2800" b="1" dirty="0" smtClean="0">
+              <a:rPr lang="bg-BG" sz="2800" b="1" dirty="0">
                 <a:solidFill>
                   <a:srgbClr val="FFFFFF"/>
                 </a:solidFill>
@@ -10003,7 +9952,7 @@
               <a:t>Избираме опцията </a:t>
             </a:r>
             <a:r>
-              <a:rPr lang="bg-BG" sz="2800" b="1" dirty="0" smtClean="0">
+              <a:rPr lang="bg-BG" sz="2800" b="1" dirty="0">
                 <a:solidFill>
                   <a:schemeClr val="bg1">
                     <a:lumMod val="60000"/>
@@ -10290,7 +10239,7 @@
           <a:p>
             <a:pPr algn="ctr"/>
             <a:r>
-              <a:rPr lang="bg-BG" sz="2800" b="1" dirty="0" smtClean="0">
+              <a:rPr lang="bg-BG" sz="2800" b="1" dirty="0">
                 <a:solidFill>
                   <a:srgbClr val="FFFFFF"/>
                 </a:solidFill>
@@ -10794,13 +10743,6 @@
       <p:transition spd="slow" advClick="0" advTm="5000"/>
     </mc:Fallback>
   </mc:AlternateContent>
-  <p:timing>
-    <p:tnLst>
-      <p:par>
-        <p:cTn id="1" dur="indefinite" restart="never" nodeType="tmRoot"/>
-      </p:par>
-    </p:tnLst>
-  </p:timing>
 </p:sld>
 </file>
 
@@ -10972,39 +10914,39 @@
           <a:lstStyle/>
           <a:p>
             <a:r>
-              <a:rPr lang="bg-BG" dirty="0" smtClean="0"/>
+              <a:rPr lang="bg-BG" dirty="0"/>
               <a:t>͏</a:t>
             </a:r>
             <a:r>
-              <a:rPr lang="bg-BG" b="1" dirty="0" smtClean="0"/>
+              <a:rPr lang="bg-BG" b="1" dirty="0"/>
               <a:t>Търсещи машини</a:t>
             </a:r>
           </a:p>
           <a:p>
             <a:r>
-              <a:rPr lang="bg-BG" dirty="0" smtClean="0"/>
+              <a:rPr lang="bg-BG" dirty="0"/>
               <a:t>͏</a:t>
             </a:r>
             <a:r>
-              <a:rPr lang="bg-BG" b="1" dirty="0" smtClean="0"/>
+              <a:rPr lang="bg-BG" b="1" dirty="0"/>
               <a:t>Ключови думи </a:t>
             </a:r>
             <a:r>
-              <a:rPr lang="bg-BG" dirty="0" smtClean="0"/>
+              <a:rPr lang="bg-BG" dirty="0"/>
               <a:t>за търсене на информация</a:t>
             </a:r>
           </a:p>
           <a:p>
             <a:r>
-              <a:rPr lang="bg-BG" dirty="0" smtClean="0"/>
+              <a:rPr lang="bg-BG" dirty="0"/>
               <a:t>͏</a:t>
             </a:r>
             <a:r>
-              <a:rPr lang="bg-BG" b="1" dirty="0" smtClean="0"/>
+              <a:rPr lang="bg-BG" b="1" dirty="0"/>
               <a:t>Разширено търсене </a:t>
             </a:r>
             <a:r>
-              <a:rPr lang="bg-BG" dirty="0" smtClean="0"/>
+              <a:rPr lang="bg-BG" dirty="0"/>
               <a:t>на информация</a:t>
             </a:r>
             <a:endParaRPr lang="en-US" dirty="0"/>
@@ -11294,11 +11236,11 @@
           <a:lstStyle/>
           <a:p>
             <a:r>
-              <a:rPr lang="bg-BG" dirty="0" smtClean="0"/>
+              <a:rPr lang="bg-BG" dirty="0"/>
               <a:t>С помощта на разширеното търсене на </a:t>
             </a:r>
             <a:r>
-              <a:rPr lang="en-US" sz="3600" b="1" dirty="0" smtClean="0">
+              <a:rPr lang="en-US" sz="3600" b="1" dirty="0">
                 <a:solidFill>
                   <a:schemeClr val="accent3"/>
                 </a:solidFill>
@@ -11306,7 +11248,7 @@
               <a:t>G</a:t>
             </a:r>
             <a:r>
-              <a:rPr lang="en-US" sz="3600" b="1" dirty="0" smtClean="0">
+              <a:rPr lang="en-US" sz="3600" b="1" dirty="0">
                 <a:solidFill>
                   <a:srgbClr val="FF0000"/>
                 </a:solidFill>
@@ -11314,7 +11256,7 @@
               <a:t>o</a:t>
             </a:r>
             <a:r>
-              <a:rPr lang="en-US" sz="3600" b="1" dirty="0" smtClean="0">
+              <a:rPr lang="en-US" sz="3600" b="1" dirty="0">
                 <a:solidFill>
                   <a:schemeClr val="accent1"/>
                 </a:solidFill>
@@ -11322,7 +11264,7 @@
               <a:t>o</a:t>
             </a:r>
             <a:r>
-              <a:rPr lang="en-US" sz="3600" b="1" dirty="0" smtClean="0">
+              <a:rPr lang="en-US" sz="3600" b="1" dirty="0">
                 <a:solidFill>
                   <a:srgbClr val="00B0F0"/>
                 </a:solidFill>
@@ -11330,7 +11272,7 @@
               <a:t>g</a:t>
             </a:r>
             <a:r>
-              <a:rPr lang="en-US" sz="3600" b="1" dirty="0" smtClean="0">
+              <a:rPr lang="en-US" sz="3600" b="1" dirty="0">
                 <a:solidFill>
                   <a:schemeClr val="accent2"/>
                 </a:solidFill>
@@ -11338,7 +11280,7 @@
               <a:t>l</a:t>
             </a:r>
             <a:r>
-              <a:rPr lang="en-US" sz="3600" b="1" dirty="0" smtClean="0">
+              <a:rPr lang="en-US" sz="3600" b="1" dirty="0">
                 <a:solidFill>
                   <a:srgbClr val="FF0000"/>
                 </a:solidFill>
@@ -11346,11 +11288,11 @@
               <a:t>e</a:t>
             </a:r>
             <a:r>
-              <a:rPr lang="en-US" sz="3600" dirty="0" smtClean="0"/>
+              <a:rPr lang="en-US" sz="3600" dirty="0"/>
               <a:t>, </a:t>
             </a:r>
             <a:r>
-              <a:rPr lang="bg-BG" sz="3600" dirty="0" smtClean="0"/>
+              <a:rPr lang="bg-BG" sz="3600" dirty="0"/>
               <a:t>потърсете информация за средната заплата в България</a:t>
             </a:r>
             <a:endParaRPr lang="en-US" dirty="0"/>
@@ -11373,7 +11315,7 @@
           <a:lstStyle/>
           <a:p>
             <a:r>
-              <a:rPr lang="bg-BG" dirty="0" smtClean="0"/>
+              <a:rPr lang="bg-BG" dirty="0"/>
               <a:t>Задача: Разширено търсене</a:t>
             </a:r>
             <a:endParaRPr lang="en-US" dirty="0"/>
@@ -11435,13 +11377,6 @@
       <p:transition spd="slow" advClick="0" advTm="5000"/>
     </mc:Fallback>
   </mc:AlternateContent>
-  <p:timing>
-    <p:tnLst>
-      <p:par>
-        <p:cTn id="1" dur="indefinite" restart="never" nodeType="tmRoot"/>
-      </p:par>
-    </p:tnLst>
-  </p:timing>
 </p:sld>
 </file>
 
@@ -12121,10 +12056,10 @@
                   </a:schemeClr>
                 </a:solidFill>
               </a:rPr>
-              <a:t>Търсеща </a:t>
-            </a:r>
-            <a:r>
-              <a:rPr lang="ru-RU" sz="2800" b="1" dirty="0" smtClean="0">
+              <a:t>Търсеща машина</a:t>
+            </a:r>
+            <a:r>
+              <a:rPr lang="en-US" sz="2800" b="1" dirty="0">
                 <a:solidFill>
                   <a:schemeClr val="bg1">
                     <a:lumMod val="60000"/>
@@ -12132,21 +12067,10 @@
                   </a:schemeClr>
                 </a:solidFill>
               </a:rPr>
-              <a:t>машина</a:t>
-            </a:r>
-            <a:r>
-              <a:rPr lang="en-US" sz="2800" b="1" dirty="0" smtClean="0">
-                <a:solidFill>
-                  <a:schemeClr val="bg1">
-                    <a:lumMod val="60000"/>
-                    <a:lumOff val="40000"/>
-                  </a:schemeClr>
-                </a:solidFill>
-              </a:rPr>
               <a:t> </a:t>
             </a:r>
             <a:r>
-              <a:rPr lang="ru-RU" sz="2800" dirty="0" smtClean="0">
+              <a:rPr lang="ru-RU" sz="2800" dirty="0">
                 <a:solidFill>
                   <a:schemeClr val="bg2"/>
                 </a:solidFill>
@@ -12167,17 +12091,9 @@
                   <a:schemeClr val="bg2"/>
                 </a:solidFill>
               </a:rPr>
-              <a:t>, която събира </a:t>
-            </a:r>
-            <a:r>
-              <a:rPr lang="ru-RU" sz="2800" dirty="0" smtClean="0">
-                <a:solidFill>
-                  <a:schemeClr val="bg2"/>
-                </a:solidFill>
-              </a:rPr>
-              <a:t>информация</a:t>
-            </a:r>
-            <a:endParaRPr lang="en-US" sz="2800" dirty="0" smtClean="0">
+              <a:t>, която събира информация</a:t>
+            </a:r>
+            <a:endParaRPr lang="en-US" sz="2800" dirty="0">
               <a:solidFill>
                 <a:schemeClr val="bg2"/>
               </a:solidFill>
@@ -12193,7 +12109,7 @@
               </a:buClr>
             </a:pPr>
             <a:r>
-              <a:rPr lang="bg-BG" sz="2600" b="1" dirty="0" smtClean="0">
+              <a:rPr lang="bg-BG" sz="2600" b="1" dirty="0">
                 <a:solidFill>
                   <a:schemeClr val="bg2"/>
                 </a:solidFill>
@@ -12201,7 +12117,7 @@
               <a:t>Улеснява</a:t>
             </a:r>
             <a:r>
-              <a:rPr lang="bg-BG" sz="2600" dirty="0" smtClean="0">
+              <a:rPr lang="bg-BG" sz="2600" dirty="0">
                 <a:solidFill>
                   <a:schemeClr val="bg2"/>
                 </a:solidFill>
@@ -12209,7 +12125,7 @@
               <a:t> извличането на </a:t>
             </a:r>
             <a:r>
-              <a:rPr lang="bg-BG" sz="2600" b="1" dirty="0" smtClean="0">
+              <a:rPr lang="bg-BG" sz="2600" b="1" dirty="0">
                 <a:solidFill>
                   <a:schemeClr val="bg2"/>
                 </a:solidFill>
@@ -12217,7 +12133,7 @@
               <a:t>информация</a:t>
             </a:r>
             <a:r>
-              <a:rPr lang="bg-BG" sz="2600" dirty="0" smtClean="0">
+              <a:rPr lang="bg-BG" sz="2600" dirty="0">
                 <a:solidFill>
                   <a:schemeClr val="bg2"/>
                 </a:solidFill>
@@ -12307,15 +12223,7 @@
                   <a:schemeClr val="bg2"/>
                 </a:solidFill>
               </a:rPr>
-              <a:t> от </a:t>
-            </a:r>
-            <a:r>
-              <a:rPr lang="ru-RU" sz="2800" dirty="0" smtClean="0">
-                <a:solidFill>
-                  <a:schemeClr val="bg2"/>
-                </a:solidFill>
-              </a:rPr>
-              <a:t>думи</a:t>
+              <a:t> от думи</a:t>
             </a:r>
           </a:p>
           <a:p>
@@ -12328,7 +12236,7 @@
               </a:buClr>
             </a:pPr>
             <a:r>
-              <a:rPr lang="ru-RU" sz="2800" b="1" dirty="0" smtClean="0">
+              <a:rPr lang="ru-RU" sz="2800" b="1" dirty="0">
                 <a:solidFill>
                   <a:schemeClr val="bg1">
                     <a:lumMod val="60000"/>
@@ -12339,7 +12247,7 @@
               <a:t>Разширено търсене </a:t>
             </a:r>
             <a:r>
-              <a:rPr lang="ru-RU" sz="2800" dirty="0" smtClean="0">
+              <a:rPr lang="ru-RU" sz="2800" dirty="0">
                 <a:solidFill>
                   <a:schemeClr val="bg2"/>
                 </a:solidFill>
@@ -12347,7 +12255,7 @@
               <a:t>– дава възможност за задаване на </a:t>
             </a:r>
             <a:r>
-              <a:rPr lang="ru-RU" sz="2800" b="1" dirty="0" smtClean="0">
+              <a:rPr lang="ru-RU" sz="2800" b="1" dirty="0">
                 <a:solidFill>
                   <a:schemeClr val="bg2"/>
                 </a:solidFill>
@@ -12355,7 +12263,7 @@
               <a:t>детайли</a:t>
             </a:r>
             <a:r>
-              <a:rPr lang="ru-RU" sz="2800" dirty="0" smtClean="0">
+              <a:rPr lang="ru-RU" sz="2800" dirty="0">
                 <a:solidFill>
                   <a:schemeClr val="bg2"/>
                 </a:solidFill>
@@ -12363,7 +12271,7 @@
               <a:t> при </a:t>
             </a:r>
             <a:r>
-              <a:rPr lang="ru-RU" sz="2800" b="1" dirty="0" smtClean="0">
+              <a:rPr lang="ru-RU" sz="2800" b="1" dirty="0">
                 <a:solidFill>
                   <a:schemeClr val="bg2"/>
                 </a:solidFill>
@@ -12371,7 +12279,7 @@
               <a:t>търсенето</a:t>
             </a:r>
             <a:r>
-              <a:rPr lang="ru-RU" sz="2800" dirty="0" smtClean="0">
+              <a:rPr lang="ru-RU" sz="2800" dirty="0">
                 <a:solidFill>
                   <a:schemeClr val="bg2"/>
                 </a:solidFill>
@@ -12379,7 +12287,7 @@
               <a:t> на </a:t>
             </a:r>
             <a:r>
-              <a:rPr lang="ru-RU" sz="2800" b="1" dirty="0" smtClean="0">
+              <a:rPr lang="ru-RU" sz="2800" b="1" dirty="0">
                 <a:solidFill>
                   <a:schemeClr val="bg2"/>
                 </a:solidFill>
@@ -12387,7 +12295,7 @@
               <a:t>информация</a:t>
             </a:r>
             <a:r>
-              <a:rPr lang="ru-RU" sz="2800" dirty="0" smtClean="0">
+              <a:rPr lang="ru-RU" sz="2800" dirty="0">
                 <a:solidFill>
                   <a:schemeClr val="bg2"/>
                 </a:solidFill>
@@ -12729,7 +12637,7 @@
                 <a:hlinkClick r:id="rId3">
                   <a:extLst>
                     <a:ext uri="{A12FA001-AC4F-418D-AE19-62706E023703}">
-                      <ahyp:hlinkClr xmlns="" xmlns:ahyp="http://schemas.microsoft.com/office/drawing/2018/hyperlinkcolor" val="tx"/>
+                      <ahyp:hlinkClr xmlns:ahyp="http://schemas.microsoft.com/office/drawing/2018/hyperlinkcolor" val="tx"/>
                     </a:ext>
                   </a:extLst>
                 </a:hlinkClick>
@@ -12802,13 +12710,6 @@
       <p:transition spd="slow" advClick="0" advTm="5000"/>
     </mc:Fallback>
   </mc:AlternateContent>
-  <p:timing>
-    <p:tnLst>
-      <p:par>
-        <p:cTn id="1" dur="indefinite" restart="never" nodeType="tmRoot"/>
-      </p:par>
-    </p:tnLst>
-  </p:timing>
 </p:sld>
 </file>
 
@@ -13192,13 +13093,6 @@
       <p:transition spd="slow" advClick="0" advTm="5000"/>
     </mc:Fallback>
   </mc:AlternateContent>
-  <p:timing>
-    <p:tnLst>
-      <p:par>
-        <p:cTn id="1" dur="indefinite" restart="never" nodeType="tmRoot"/>
-      </p:par>
-    </p:tnLst>
-  </p:timing>
 </p:sld>
 </file>
 
@@ -13240,14 +13134,13 @@
           <a:lstStyle/>
           <a:p>
             <a:r>
-              <a:rPr lang="bg-BG" dirty="0" smtClean="0"/>
+              <a:rPr lang="bg-BG" dirty="0"/>
               <a:t>Програми за извличане на информация от </a:t>
             </a:r>
             <a:r>
-              <a:rPr lang="en-US" dirty="0" smtClean="0"/>
+              <a:rPr lang="en-US" dirty="0"/>
               <a:t>World Wide Web</a:t>
             </a:r>
-            <a:endParaRPr lang="en-US" dirty="0"/>
           </a:p>
         </p:txBody>
       </p:sp>
@@ -13268,11 +13161,7 @@
           <a:p>
             <a:r>
               <a:rPr lang="bg-BG" dirty="0"/>
-              <a:t>͏Търсещи </a:t>
-            </a:r>
-            <a:r>
-              <a:rPr lang="bg-BG" dirty="0" smtClean="0"/>
-              <a:t>машини</a:t>
+              <a:t>͏Търсещи машини</a:t>
             </a:r>
             <a:endParaRPr lang="en-US" dirty="0"/>
           </a:p>
@@ -13365,13 +13254,6 @@
       <p:transition spd="slow" advClick="0" advTm="5000"/>
     </mc:Fallback>
   </mc:AlternateContent>
-  <p:timing>
-    <p:tnLst>
-      <p:par>
-        <p:cTn id="1" dur="indefinite" restart="never" nodeType="tmRoot"/>
-      </p:par>
-    </p:tnLst>
-  </p:timing>
 </p:sld>
 </file>
 
@@ -13415,37 +13297,37 @@
           <a:lstStyle/>
           <a:p>
             <a:r>
-              <a:rPr lang="bg-BG" sz="3500" dirty="0" smtClean="0"/>
+              <a:rPr lang="bg-BG" sz="3500" dirty="0"/>
               <a:t>Обемът на информация в интернет е </a:t>
             </a:r>
             <a:r>
-              <a:rPr lang="bg-BG" sz="3500" b="1" dirty="0" smtClean="0"/>
+              <a:rPr lang="bg-BG" sz="3500" b="1" dirty="0"/>
               <a:t>огромен</a:t>
             </a:r>
             <a:r>
-              <a:rPr lang="bg-BG" sz="3500" dirty="0" smtClean="0"/>
+              <a:rPr lang="bg-BG" sz="3500" dirty="0"/>
               <a:t> и </a:t>
             </a:r>
             <a:r>
-              <a:rPr lang="bg-BG" sz="3500" b="1" dirty="0" smtClean="0"/>
+              <a:rPr lang="bg-BG" sz="3500" b="1" dirty="0"/>
               <a:t>нараства</a:t>
             </a:r>
             <a:r>
-              <a:rPr lang="bg-BG" sz="3500" dirty="0" smtClean="0"/>
+              <a:rPr lang="bg-BG" sz="3500" dirty="0"/>
               <a:t> с все по-големи темпове </a:t>
             </a:r>
             <a:r>
-              <a:rPr lang="bg-BG" sz="3500" b="1" dirty="0" smtClean="0"/>
+              <a:rPr lang="bg-BG" sz="3500" b="1" dirty="0"/>
               <a:t>ежедневно</a:t>
             </a:r>
           </a:p>
           <a:p>
             <a:r>
-              <a:rPr lang="ru-RU" b="1" dirty="0" smtClean="0"/>
+              <a:rPr lang="ru-RU" b="1" dirty="0"/>
               <a:t>͏</a:t>
             </a:r>
             <a:r>
-              <a:rPr lang="ru-RU" sz="3500" b="1" dirty="0" smtClean="0">
+              <a:rPr lang="ru-RU" sz="3500" b="1" dirty="0">
                 <a:solidFill>
                   <a:schemeClr val="bg1"/>
                 </a:solidFill>
@@ -13453,23 +13335,23 @@
               <a:t>Търсеща машина </a:t>
             </a:r>
             <a:r>
-              <a:rPr lang="ru-RU" sz="3500" dirty="0" smtClean="0"/>
+              <a:rPr lang="ru-RU" sz="3500" dirty="0"/>
               <a:t>(</a:t>
             </a:r>
             <a:r>
-              <a:rPr lang="ru-RU" sz="3500" b="1" dirty="0" smtClean="0"/>
+              <a:rPr lang="ru-RU" sz="3500" b="1" dirty="0"/>
               <a:t>търсачка</a:t>
             </a:r>
             <a:r>
-              <a:rPr lang="ru-RU" sz="3500" dirty="0" smtClean="0"/>
+              <a:rPr lang="ru-RU" sz="3500" dirty="0"/>
               <a:t>) – </a:t>
             </a:r>
             <a:r>
-              <a:rPr lang="ru-RU" sz="3500" b="1" dirty="0" smtClean="0"/>
+              <a:rPr lang="ru-RU" sz="3500" b="1" dirty="0"/>
               <a:t>софтуерна система</a:t>
             </a:r>
             <a:r>
-              <a:rPr lang="ru-RU" sz="3500" dirty="0" smtClean="0"/>
+              <a:rPr lang="ru-RU" sz="3500" dirty="0"/>
               <a:t>, която събира информация от всички достъпни източници в интернет</a:t>
             </a:r>
           </a:p>
@@ -13477,47 +13359,39 @@
             <a:pPr lvl="1"/>
             <a:r>
               <a:rPr lang="ru-RU" b="1" dirty="0"/>
-              <a:t>У</a:t>
-            </a:r>
-            <a:r>
-              <a:rPr lang="ru-RU" b="1" dirty="0" smtClean="0"/>
-              <a:t>леснява </a:t>
-            </a:r>
-            <a:r>
-              <a:rPr lang="ru-RU" b="1" dirty="0"/>
-              <a:t>извличането </a:t>
+              <a:t>Улеснява извличането </a:t>
             </a:r>
             <a:r>
               <a:rPr lang="ru-RU" dirty="0"/>
               <a:t>на информация от </a:t>
             </a:r>
             <a:r>
-              <a:rPr lang="bg-BG" b="1" dirty="0" smtClean="0"/>
+              <a:rPr lang="bg-BG" b="1" dirty="0"/>
               <a:t>световната мрежа </a:t>
             </a:r>
           </a:p>
           <a:p>
             <a:r>
-              <a:rPr lang="ru-RU" sz="3500" dirty="0" smtClean="0"/>
+              <a:rPr lang="ru-RU" sz="3500" dirty="0"/>
               <a:t>Най-популярни </a:t>
             </a:r>
             <a:r>
-              <a:rPr lang="ru-RU" sz="3500" b="1" dirty="0" smtClean="0"/>
+              <a:rPr lang="ru-RU" sz="3500" b="1" dirty="0"/>
               <a:t>търсачки</a:t>
             </a:r>
             <a:r>
-              <a:rPr lang="ru-RU" sz="3500" dirty="0" smtClean="0"/>
+              <a:rPr lang="ru-RU" sz="3500" dirty="0"/>
               <a:t>:</a:t>
             </a:r>
           </a:p>
           <a:p>
             <a:pPr lvl="1"/>
             <a:r>
-              <a:rPr lang="en-US" dirty="0" smtClean="0"/>
+              <a:rPr lang="en-US" dirty="0"/>
               <a:t>͏</a:t>
             </a:r>
             <a:r>
-              <a:rPr lang="en-US" sz="3200" b="1" dirty="0" smtClean="0">
+              <a:rPr lang="en-US" sz="3200" b="1" dirty="0">
                 <a:solidFill>
                   <a:schemeClr val="accent3"/>
                 </a:solidFill>
@@ -13525,7 +13399,7 @@
               <a:t>G</a:t>
             </a:r>
             <a:r>
-              <a:rPr lang="en-US" sz="3200" b="1" dirty="0" smtClean="0">
+              <a:rPr lang="en-US" sz="3200" b="1" dirty="0">
                 <a:solidFill>
                   <a:srgbClr val="FF0000"/>
                 </a:solidFill>
@@ -13533,7 +13407,7 @@
               <a:t>o</a:t>
             </a:r>
             <a:r>
-              <a:rPr lang="en-US" sz="3200" b="1" dirty="0" smtClean="0">
+              <a:rPr lang="en-US" sz="3200" b="1" dirty="0">
                 <a:solidFill>
                   <a:schemeClr val="accent1"/>
                 </a:solidFill>
@@ -13541,7 +13415,7 @@
               <a:t>o</a:t>
             </a:r>
             <a:r>
-              <a:rPr lang="en-US" sz="3200" b="1" dirty="0" smtClean="0">
+              <a:rPr lang="en-US" sz="3200" b="1" dirty="0">
                 <a:solidFill>
                   <a:srgbClr val="00B0F0"/>
                 </a:solidFill>
@@ -13549,7 +13423,7 @@
               <a:t>g</a:t>
             </a:r>
             <a:r>
-              <a:rPr lang="en-US" sz="3200" b="1" dirty="0" smtClean="0">
+              <a:rPr lang="en-US" sz="3200" b="1" dirty="0">
                 <a:solidFill>
                   <a:schemeClr val="accent2"/>
                 </a:solidFill>
@@ -13557,7 +13431,7 @@
               <a:t>l</a:t>
             </a:r>
             <a:r>
-              <a:rPr lang="en-US" sz="3200" b="1" dirty="0" smtClean="0">
+              <a:rPr lang="en-US" sz="3200" b="1" dirty="0">
                 <a:solidFill>
                   <a:srgbClr val="FF0000"/>
                 </a:solidFill>
@@ -13565,7 +13439,7 @@
               <a:t>e</a:t>
             </a:r>
             <a:r>
-              <a:rPr lang="bg-BG" sz="3200" b="1" dirty="0" smtClean="0">
+              <a:rPr lang="bg-BG" sz="3200" b="1" dirty="0">
                 <a:solidFill>
                   <a:srgbClr val="FF0000"/>
                 </a:solidFill>
@@ -13573,31 +13447,31 @@
               <a:t> </a:t>
             </a:r>
             <a:r>
-              <a:rPr lang="bg-BG" sz="3200" b="1" dirty="0" smtClean="0"/>
+              <a:rPr lang="bg-BG" sz="3200" b="1" dirty="0"/>
               <a:t>– </a:t>
             </a:r>
             <a:r>
-              <a:rPr lang="en-US" sz="3200" b="1" dirty="0" smtClean="0">
+              <a:rPr lang="en-US" sz="3200" b="1" dirty="0">
                 <a:hlinkClick r:id="rId2"/>
               </a:rPr>
               <a:t>www.google.com</a:t>
             </a:r>
-            <a:endParaRPr lang="en-US" sz="3200" b="1" dirty="0" smtClean="0"/>
+            <a:endParaRPr lang="en-US" sz="3200" b="1" dirty="0"/>
           </a:p>
           <a:p>
             <a:pPr lvl="1"/>
             <a:r>
-              <a:rPr lang="en-US" sz="3200" b="1" dirty="0" smtClean="0"/>
+              <a:rPr lang="en-US" sz="3200" b="1" dirty="0"/>
               <a:t>Bing – </a:t>
             </a:r>
             <a:r>
-              <a:rPr lang="en-US" sz="3200" b="1" dirty="0" smtClean="0">
+              <a:rPr lang="en-US" sz="3200" b="1" dirty="0">
                 <a:hlinkClick r:id="rId3"/>
               </a:rPr>
               <a:t>www.bing.com</a:t>
             </a:r>
             <a:r>
-              <a:rPr lang="en-US" sz="3200" b="1" dirty="0" smtClean="0"/>
+              <a:rPr lang="en-US" sz="3200" b="1" dirty="0"/>
               <a:t> </a:t>
             </a:r>
             <a:endParaRPr lang="en-US" dirty="0"/>
@@ -14104,13 +13978,6 @@
       <p:transition spd="slow" advClick="0" advTm="5000"/>
     </mc:Fallback>
   </mc:AlternateContent>
-  <p:timing>
-    <p:tnLst>
-      <p:par>
-        <p:cTn id="1" dur="indefinite" restart="never" nodeType="tmRoot"/>
-      </p:par>
-    </p:tnLst>
-  </p:timing>
 </p:sld>
 </file>
 
@@ -14147,11 +14014,11 @@
           <a:lstStyle/>
           <a:p>
             <a:r>
-              <a:rPr lang="ru-RU" dirty="0" smtClean="0"/>
+              <a:rPr lang="ru-RU" dirty="0"/>
               <a:t>͏</a:t>
             </a:r>
             <a:r>
-              <a:rPr lang="ru-RU" b="1" dirty="0" smtClean="0">
+              <a:rPr lang="ru-RU" b="1" dirty="0">
                 <a:solidFill>
                   <a:schemeClr val="bg1"/>
                 </a:solidFill>
@@ -14159,22 +14026,14 @@
               <a:t>Ключови думи </a:t>
             </a:r>
             <a:r>
-              <a:rPr lang="en-US" dirty="0" smtClean="0"/>
+              <a:rPr lang="en-US" dirty="0"/>
               <a:t>–</a:t>
             </a:r>
             <a:r>
-              <a:rPr lang="ru-RU" dirty="0" smtClean="0"/>
-              <a:t> </a:t>
-            </a:r>
-            <a:r>
               <a:rPr lang="ru-RU" dirty="0"/>
-              <a:t>специфични термини, фрази или комбинации от </a:t>
-            </a:r>
-            <a:r>
-              <a:rPr lang="ru-RU" dirty="0" smtClean="0"/>
-              <a:t>думи</a:t>
-            </a:r>
-            <a:endParaRPr lang="en-US" dirty="0" smtClean="0"/>
+              <a:t> специфични термини, фрази или комбинации от думи</a:t>
+            </a:r>
+            <a:endParaRPr lang="en-US" dirty="0"/>
           </a:p>
           <a:p>
             <a:pPr lvl="1">
@@ -14183,28 +14042,12 @@
               </a:spcAft>
             </a:pPr>
             <a:r>
-              <a:rPr lang="bg-BG" dirty="0" smtClean="0"/>
+              <a:rPr lang="bg-BG" dirty="0"/>
               <a:t>П</a:t>
             </a:r>
             <a:r>
-              <a:rPr lang="ru-RU" dirty="0" smtClean="0"/>
-              <a:t>отребителите ги </a:t>
-            </a:r>
-            <a:r>
               <a:rPr lang="ru-RU" dirty="0"/>
-              <a:t>въвеждат в </a:t>
-            </a:r>
-            <a:r>
-              <a:rPr lang="ru-RU" dirty="0" smtClean="0"/>
-              <a:t>търсачка, </a:t>
-            </a:r>
-            <a:r>
-              <a:rPr lang="ru-RU" dirty="0"/>
-              <a:t>за да намерят подходяща информация или данни по определена тема или </a:t>
-            </a:r>
-            <a:r>
-              <a:rPr lang="ru-RU" dirty="0" smtClean="0"/>
-              <a:t>предмет</a:t>
+              <a:t>отребителите ги въвеждат в търсачка, за да намерят подходяща информация по определена тема</a:t>
             </a:r>
           </a:p>
           <a:p>
@@ -14214,7 +14057,7 @@
               </a:spcAft>
             </a:pPr>
             <a:r>
-              <a:rPr lang="ru-RU" dirty="0" smtClean="0"/>
+              <a:rPr lang="ru-RU" dirty="0"/>
               <a:t>Подредбата и изборът на ключовите думи има значение за намиране на по-точна информация</a:t>
             </a:r>
             <a:endParaRPr lang="en-US" dirty="0"/>
@@ -14459,7 +14302,7 @@
           <a:lstStyle/>
           <a:p>
             <a:r>
-              <a:rPr lang="bg-BG" sz="3500" dirty="0" smtClean="0"/>
+              <a:rPr lang="bg-BG" sz="3500" dirty="0"/>
               <a:t>Търсене на информация в интернет с ключови думи</a:t>
             </a:r>
             <a:endParaRPr lang="en-US" sz="3500" dirty="0"/>
@@ -14487,8 +14330,8 @@
         </p:blipFill>
         <p:spPr>
           <a:xfrm>
-            <a:off x="0" y="1101149"/>
-            <a:ext cx="12192000" cy="5792851"/>
+            <a:off x="0" y="1089001"/>
+            <a:ext cx="12192000" cy="5805000"/>
           </a:xfrm>
           <a:prstGeom prst="rect">
             <a:avLst/>
@@ -14555,7 +14398,7 @@
           <a:p>
             <a:pPr algn="ctr"/>
             <a:r>
-              <a:rPr lang="bg-BG" sz="2800" b="1" dirty="0" smtClean="0">
+              <a:rPr lang="bg-BG" sz="2800" b="1" dirty="0">
                 <a:solidFill>
                   <a:srgbClr val="FFFFFF"/>
                 </a:solidFill>
@@ -14570,7 +14413,7 @@
               <a:t>За да потърсим информация, трябва да отворим бразузъра и да въведем адреса на търсачката, която ще използваме – </a:t>
             </a:r>
             <a:r>
-              <a:rPr lang="en-US" sz="2800" b="1" dirty="0" smtClean="0">
+              <a:rPr lang="en-US" sz="2800" b="1" dirty="0">
                 <a:solidFill>
                   <a:schemeClr val="bg1">
                     <a:lumMod val="60000"/>
@@ -14666,7 +14509,7 @@
           <a:p>
             <a:pPr algn="ctr"/>
             <a:r>
-              <a:rPr lang="bg-BG" sz="2800" b="1" dirty="0" smtClean="0">
+              <a:rPr lang="bg-BG" sz="2800" b="1" dirty="0">
                 <a:solidFill>
                   <a:srgbClr val="FFFFFF"/>
                 </a:solidFill>
@@ -14904,7 +14747,7 @@
           <a:lstStyle/>
           <a:p>
             <a:r>
-              <a:rPr lang="bg-BG" sz="3500" dirty="0" smtClean="0"/>
+              <a:rPr lang="bg-BG" sz="3500" dirty="0"/>
               <a:t>Търсене на информация в интернет с ключови думи</a:t>
             </a:r>
             <a:endParaRPr lang="en-US" sz="3500" dirty="0"/>
@@ -14932,8 +14775,8 @@
         </p:blipFill>
         <p:spPr>
           <a:xfrm>
-            <a:off x="0" y="1101150"/>
-            <a:ext cx="12192000" cy="5792850"/>
+            <a:off x="0" y="1044000"/>
+            <a:ext cx="12192000" cy="5850000"/>
           </a:xfrm>
           <a:prstGeom prst="rect">
             <a:avLst/>
@@ -15000,7 +14843,7 @@
           <a:p>
             <a:pPr algn="ctr"/>
             <a:r>
-              <a:rPr lang="bg-BG" sz="2800" b="1" dirty="0" smtClean="0">
+              <a:rPr lang="bg-BG" sz="2800" b="1" dirty="0">
                 <a:solidFill>
                   <a:srgbClr val="FFFFFF"/>
                 </a:solidFill>
@@ -15192,7 +15035,7 @@
           <a:lstStyle/>
           <a:p>
             <a:r>
-              <a:rPr lang="bg-BG" sz="3500" dirty="0" smtClean="0"/>
+              <a:rPr lang="bg-BG" sz="3500" dirty="0"/>
               <a:t>Търсене на информация в интернет с ключови думи</a:t>
             </a:r>
             <a:endParaRPr lang="en-US" sz="3500" dirty="0"/>
@@ -15220,8 +15063,8 @@
         </p:blipFill>
         <p:spPr>
           <a:xfrm>
-            <a:off x="0" y="1101149"/>
-            <a:ext cx="12192000" cy="5792851"/>
+            <a:off x="0" y="1089001"/>
+            <a:ext cx="12192000" cy="5805000"/>
           </a:xfrm>
           <a:prstGeom prst="rect">
             <a:avLst/>
@@ -15246,13 +15089,6 @@
       <p:transition spd="slow" advClick="0" advTm="5000"/>
     </mc:Fallback>
   </mc:AlternateContent>
-  <p:timing>
-    <p:tnLst>
-      <p:par>
-        <p:cTn id="1" dur="indefinite" restart="never" nodeType="tmRoot"/>
-      </p:par>
-    </p:tnLst>
-  </p:timing>
 </p:sld>
 </file>
 

</xml_diff>

<commit_message>
Many fixes and TODOs
</commit_message>
<xml_diff>
--- a/Courses/Computer-Modeling-and-IT/Computer-Modeling-and-IT-5-Class/08-Search-for-Information-on-a-Given-Topic/08-Search-for-Information-on-a-Given-Topic.pptx
+++ b/Courses/Computer-Modeling-and-IT/Computer-Modeling-and-IT-5-Class/08-Search-for-Information-on-a-Given-Topic/08-Search-for-Information-on-a-Given-Topic.pptx
@@ -295,7 +295,7 @@
           <a:p>
             <a:fld id="{4E087215-0C8F-4762-A664-737A353EC9A4}" type="datetimeFigureOut">
               <a:rPr lang="bg-BG" smtClean="0"/>
-              <a:t>31.10.23 г.</a:t>
+              <a:t>3.1.2024 г.</a:t>
             </a:fld>
             <a:endParaRPr lang="bg-BG"/>
           </a:p>
@@ -491,7 +491,7 @@
           <a:p>
             <a:fld id="{72D84649-876A-46C9-8472-14CB09C070D8}" type="datetimeFigureOut">
               <a:rPr lang="en-US" smtClean="0"/>
-              <a:t>10/31/23</a:t>
+              <a:t>3-Jan-24</a:t>
             </a:fld>
             <a:endParaRPr lang="en-US"/>
           </a:p>
@@ -4231,7 +4231,7 @@
             <a:fld id="{055373AC-9AA7-423B-BA00-BA1C74164DBD}" type="datetime1">
               <a:rPr lang="en-US" smtClean="0"/>
               <a:pPr/>
-              <a:t>10/31/23</a:t>
+              <a:t>3-Jan-24</a:t>
             </a:fld>
             <a:endParaRPr lang="en-US" dirty="0"/>
           </a:p>
@@ -9673,6 +9673,84 @@
                   <a:lumMod val="60000"/>
                   <a:lumOff val="40000"/>
                 </a:schemeClr>
+              </a:solidFill>
+              <a:effectLst>
+                <a:outerShdw blurRad="38100" dist="38100" dir="2700000" algn="tl">
+                  <a:srgbClr val="000000">
+                    <a:alpha val="43137"/>
+                  </a:srgbClr>
+                </a:outerShdw>
+              </a:effectLst>
+            </a:endParaRPr>
+          </a:p>
+        </p:txBody>
+      </p:sp>
+      <p:sp>
+        <p:nvSpPr>
+          <p:cNvPr id="3" name="Rectangle: Rounded Corners 2">
+            <a:extLst>
+              <a:ext uri="{FF2B5EF4-FFF2-40B4-BE49-F238E27FC236}">
+                <a16:creationId xmlns:a16="http://schemas.microsoft.com/office/drawing/2014/main" id="{AAB672CA-F377-0441-ED06-D68AA94B54FC}"/>
+              </a:ext>
+            </a:extLst>
+          </p:cNvPr>
+          <p:cNvSpPr/>
+          <p:nvPr/>
+        </p:nvSpPr>
+        <p:spPr bwMode="auto">
+          <a:xfrm>
+            <a:off x="966000" y="4329000"/>
+            <a:ext cx="3510000" cy="1890000"/>
+          </a:xfrm>
+          <a:prstGeom prst="roundRect">
+            <a:avLst/>
+          </a:prstGeom>
+          <a:ln/>
+        </p:spPr>
+        <p:style>
+          <a:lnRef idx="2">
+            <a:schemeClr val="accent4">
+              <a:shade val="15000"/>
+            </a:schemeClr>
+          </a:lnRef>
+          <a:fillRef idx="1">
+            <a:schemeClr val="accent4"/>
+          </a:fillRef>
+          <a:effectRef idx="0">
+            <a:schemeClr val="accent4"/>
+          </a:effectRef>
+          <a:fontRef idx="minor">
+            <a:schemeClr val="lt1"/>
+          </a:fontRef>
+        </p:style>
+        <p:txBody>
+          <a:bodyPr rot="0" spcFirstLastPara="0" vertOverflow="overflow" horzOverflow="overflow" vert="horz" wrap="square" lIns="91440" tIns="45720" rIns="91440" bIns="45720" numCol="1" spcCol="0" rtlCol="0" fromWordArt="0" anchor="ctr" anchorCtr="0" forceAA="0" compatLnSpc="1">
+            <a:prstTxWarp prst="textNoShape">
+              <a:avLst/>
+            </a:prstTxWarp>
+            <a:noAutofit/>
+          </a:bodyPr>
+          <a:lstStyle/>
+          <a:p>
+            <a:pPr algn="ctr"/>
+            <a:r>
+              <a:rPr lang="bg-BG" sz="4400" b="1" dirty="0">
+                <a:solidFill>
+                  <a:srgbClr val="FFFFFF"/>
+                </a:solidFill>
+                <a:effectLst>
+                  <a:outerShdw blurRad="38100" dist="38100" dir="2700000" algn="tl">
+                    <a:srgbClr val="000000">
+                      <a:alpha val="43137"/>
+                    </a:srgbClr>
+                  </a:outerShdw>
+                </a:effectLst>
+              </a:rPr>
+              <a:t>По-големи картинки!</a:t>
+            </a:r>
+            <a:endParaRPr lang="en-US" sz="4400" b="1" dirty="0">
+              <a:solidFill>
+                <a:srgbClr val="FFFFFF"/>
               </a:solidFill>
               <a:effectLst>
                 <a:outerShdw blurRad="38100" dist="38100" dir="2700000" algn="tl">

</xml_diff>